<commit_message>
Added First Chunk Generation with MC
</commit_message>
<xml_diff>
--- a/Computergrafik Praktikum.pptx
+++ b/Computergrafik Praktikum.pptx
@@ -5,10 +5,10 @@
     <p:sldMasterId id="2147483696" r:id="rId4"/>
   </p:sldMasterIdLst>
   <p:notesMasterIdLst>
-    <p:notesMasterId r:id="rId11"/>
+    <p:notesMasterId r:id="rId12"/>
   </p:notesMasterIdLst>
   <p:handoutMasterIdLst>
-    <p:handoutMasterId r:id="rId12"/>
+    <p:handoutMasterId r:id="rId13"/>
   </p:handoutMasterIdLst>
   <p:sldIdLst>
     <p:sldId id="306" r:id="rId5"/>
@@ -17,6 +17,7 @@
     <p:sldId id="310" r:id="rId8"/>
     <p:sldId id="311" r:id="rId9"/>
     <p:sldId id="312" r:id="rId10"/>
+    <p:sldId id="313" r:id="rId11"/>
   </p:sldIdLst>
   <p:sldSz cx="12192000" cy="6858000"/>
   <p:notesSz cx="6858000" cy="9144000"/>
@@ -9272,7 +9273,7 @@
           <a:p>
             <a:fld id="{67702A17-7AE3-4B44-889C-4D77A0FC7177}" type="datetime1">
               <a:rPr lang="de-DE" smtClean="0"/>
-              <a:t>09.11.2022</a:t>
+              <a:t>18.11.2022</a:t>
             </a:fld>
             <a:endParaRPr lang="de-DE" dirty="0"/>
           </a:p>
@@ -9452,7 +9453,7 @@
             <a:fld id="{82650ACC-C7DD-445E-BC27-71FC31906D7B}" type="datetime1">
               <a:rPr lang="de-DE" smtClean="0"/>
               <a:pPr/>
-              <a:t>09.11.2022</a:t>
+              <a:t>18.11.2022</a:t>
             </a:fld>
             <a:endParaRPr lang="de-DE" dirty="0"/>
           </a:p>
@@ -21845,6 +21846,471 @@
 </p:sld>
 </file>
 
+<file path=ppt/slides/slide7.xml><?xml version="1.0" encoding="utf-8"?>
+<p:sld xmlns:a="http://schemas.openxmlformats.org/drawingml/2006/main" xmlns:r="http://schemas.openxmlformats.org/officeDocument/2006/relationships" xmlns:p="http://schemas.openxmlformats.org/presentationml/2006/main">
+  <p:cSld>
+    <p:spTree>
+      <p:nvGrpSpPr>
+        <p:cNvPr id="1" name=""/>
+        <p:cNvGrpSpPr/>
+        <p:nvPr/>
+      </p:nvGrpSpPr>
+      <p:grpSpPr>
+        <a:xfrm>
+          <a:off x="0" y="0"/>
+          <a:ext cx="0" cy="0"/>
+          <a:chOff x="0" y="0"/>
+          <a:chExt cx="0" cy="0"/>
+        </a:xfrm>
+      </p:grpSpPr>
+      <p:sp>
+        <p:nvSpPr>
+          <p:cNvPr id="2" name="Titel 1">
+            <a:extLst>
+              <a:ext uri="{FF2B5EF4-FFF2-40B4-BE49-F238E27FC236}">
+                <a16:creationId xmlns:a16="http://schemas.microsoft.com/office/drawing/2014/main" id="{6486B241-B0F4-3C41-A754-3621162A5DF3}"/>
+              </a:ext>
+            </a:extLst>
+          </p:cNvPr>
+          <p:cNvSpPr>
+            <a:spLocks noGrp="1"/>
+          </p:cNvSpPr>
+          <p:nvPr>
+            <p:ph type="title"/>
+          </p:nvPr>
+        </p:nvSpPr>
+        <p:spPr/>
+        <p:txBody>
+          <a:bodyPr>
+            <a:normAutofit/>
+          </a:bodyPr>
+          <a:lstStyle/>
+          <a:p>
+            <a:r>
+              <a:rPr lang="de-DE" dirty="0"/>
+              <a:t>Meeting </a:t>
+            </a:r>
+            <a:r>
+              <a:rPr lang="de-DE" dirty="0" err="1"/>
+              <a:t>No</a:t>
+            </a:r>
+            <a:r>
+              <a:rPr lang="de-DE" dirty="0"/>
+              <a:t>. 01 22.11.22</a:t>
+            </a:r>
+          </a:p>
+        </p:txBody>
+      </p:sp>
+      <p:sp>
+        <p:nvSpPr>
+          <p:cNvPr id="3" name="Inhaltsplatzhalter 2">
+            <a:extLst>
+              <a:ext uri="{FF2B5EF4-FFF2-40B4-BE49-F238E27FC236}">
+                <a16:creationId xmlns:a16="http://schemas.microsoft.com/office/drawing/2014/main" id="{8104E86C-6562-3D59-6B1F-1109F282E63C}"/>
+              </a:ext>
+            </a:extLst>
+          </p:cNvPr>
+          <p:cNvSpPr>
+            <a:spLocks noGrp="1"/>
+          </p:cNvSpPr>
+          <p:nvPr>
+            <p:ph idx="1"/>
+          </p:nvPr>
+        </p:nvSpPr>
+        <p:spPr/>
+        <p:txBody>
+          <a:bodyPr/>
+          <a:lstStyle/>
+          <a:p>
+            <a:endParaRPr lang="de-DE" dirty="0"/>
+          </a:p>
+          <a:p>
+            <a:endParaRPr lang="de-DE" dirty="0"/>
+          </a:p>
+        </p:txBody>
+      </p:sp>
+      <p:sp>
+        <p:nvSpPr>
+          <p:cNvPr id="4" name="Foliennummernplatzhalter 3">
+            <a:extLst>
+              <a:ext uri="{FF2B5EF4-FFF2-40B4-BE49-F238E27FC236}">
+                <a16:creationId xmlns:a16="http://schemas.microsoft.com/office/drawing/2014/main" id="{112574EA-713E-A19F-F991-1F9FF7E43A83}"/>
+              </a:ext>
+            </a:extLst>
+          </p:cNvPr>
+          <p:cNvSpPr>
+            <a:spLocks noGrp="1"/>
+          </p:cNvSpPr>
+          <p:nvPr>
+            <p:ph type="sldNum" sz="quarter" idx="12"/>
+          </p:nvPr>
+        </p:nvSpPr>
+        <p:spPr/>
+        <p:txBody>
+          <a:bodyPr/>
+          <a:lstStyle/>
+          <a:p>
+            <a:pPr rtl="0"/>
+            <a:fld id="{D8DA9DAA-006C-4F4B-980E-E3DF019B24E2}" type="slidenum">
+              <a:rPr lang="de-DE" noProof="0" smtClean="0"/>
+              <a:t>7</a:t>
+            </a:fld>
+            <a:endParaRPr lang="de-DE" noProof="0"/>
+          </a:p>
+        </p:txBody>
+      </p:sp>
+      <p:sp>
+        <p:nvSpPr>
+          <p:cNvPr id="5" name="Inhaltsplatzhalter 2">
+            <a:extLst>
+              <a:ext uri="{FF2B5EF4-FFF2-40B4-BE49-F238E27FC236}">
+                <a16:creationId xmlns:a16="http://schemas.microsoft.com/office/drawing/2014/main" id="{A4760D2C-3B03-E7F3-E9BC-3DBCD16C5035}"/>
+              </a:ext>
+            </a:extLst>
+          </p:cNvPr>
+          <p:cNvSpPr txBox="1">
+            <a:spLocks/>
+          </p:cNvSpPr>
+          <p:nvPr/>
+        </p:nvSpPr>
+        <p:spPr>
+          <a:xfrm>
+            <a:off x="990600" y="1978025"/>
+            <a:ext cx="10515600" cy="4351338"/>
+          </a:xfrm>
+          <a:prstGeom prst="rect">
+            <a:avLst/>
+          </a:prstGeom>
+        </p:spPr>
+        <p:txBody>
+          <a:bodyPr vert="horz" lIns="91440" tIns="45720" rIns="91440" bIns="45720" rtlCol="0">
+            <a:normAutofit/>
+          </a:bodyPr>
+          <a:lstStyle>
+            <a:lvl1pPr marL="228600" indent="-228600" algn="l" defTabSz="914400" rtl="0" eaLnBrk="1" latinLnBrk="0" hangingPunct="1">
+              <a:lnSpc>
+                <a:spcPct val="90000"/>
+              </a:lnSpc>
+              <a:spcBef>
+                <a:spcPts val="1000"/>
+              </a:spcBef>
+              <a:buFont typeface="Arial" panose="020B0604020202020204" pitchFamily="34" charset="0"/>
+              <a:buChar char="•"/>
+              <a:defRPr sz="2800" kern="1200">
+                <a:solidFill>
+                  <a:schemeClr val="tx1"/>
+                </a:solidFill>
+                <a:latin typeface="+mn-lt"/>
+                <a:ea typeface="+mn-ea"/>
+                <a:cs typeface="+mn-cs"/>
+              </a:defRPr>
+            </a:lvl1pPr>
+            <a:lvl2pPr marL="685800" indent="-228600" algn="l" defTabSz="914400" rtl="0" eaLnBrk="1" latinLnBrk="0" hangingPunct="1">
+              <a:lnSpc>
+                <a:spcPct val="90000"/>
+              </a:lnSpc>
+              <a:spcBef>
+                <a:spcPts val="500"/>
+              </a:spcBef>
+              <a:buFont typeface="Arial" panose="020B0604020202020204" pitchFamily="34" charset="0"/>
+              <a:buChar char="•"/>
+              <a:defRPr sz="2400" kern="1200">
+                <a:solidFill>
+                  <a:schemeClr val="tx1"/>
+                </a:solidFill>
+                <a:latin typeface="+mn-lt"/>
+                <a:ea typeface="+mn-ea"/>
+                <a:cs typeface="+mn-cs"/>
+              </a:defRPr>
+            </a:lvl2pPr>
+            <a:lvl3pPr marL="1143000" indent="-228600" algn="l" defTabSz="914400" rtl="0" eaLnBrk="1" latinLnBrk="0" hangingPunct="1">
+              <a:lnSpc>
+                <a:spcPct val="90000"/>
+              </a:lnSpc>
+              <a:spcBef>
+                <a:spcPts val="500"/>
+              </a:spcBef>
+              <a:buFont typeface="Arial" panose="020B0604020202020204" pitchFamily="34" charset="0"/>
+              <a:buChar char="•"/>
+              <a:defRPr sz="2000" kern="1200">
+                <a:solidFill>
+                  <a:schemeClr val="tx1"/>
+                </a:solidFill>
+                <a:latin typeface="+mn-lt"/>
+                <a:ea typeface="+mn-ea"/>
+                <a:cs typeface="+mn-cs"/>
+              </a:defRPr>
+            </a:lvl3pPr>
+            <a:lvl4pPr marL="1600200" indent="-228600" algn="l" defTabSz="914400" rtl="0" eaLnBrk="1" latinLnBrk="0" hangingPunct="1">
+              <a:lnSpc>
+                <a:spcPct val="90000"/>
+              </a:lnSpc>
+              <a:spcBef>
+                <a:spcPts val="500"/>
+              </a:spcBef>
+              <a:buFont typeface="Arial" panose="020B0604020202020204" pitchFamily="34" charset="0"/>
+              <a:buChar char="•"/>
+              <a:defRPr sz="1800" kern="1200">
+                <a:solidFill>
+                  <a:schemeClr val="tx1"/>
+                </a:solidFill>
+                <a:latin typeface="+mn-lt"/>
+                <a:ea typeface="+mn-ea"/>
+                <a:cs typeface="+mn-cs"/>
+              </a:defRPr>
+            </a:lvl4pPr>
+            <a:lvl5pPr marL="2057400" indent="-228600" algn="l" defTabSz="914400" rtl="0" eaLnBrk="1" latinLnBrk="0" hangingPunct="1">
+              <a:lnSpc>
+                <a:spcPct val="90000"/>
+              </a:lnSpc>
+              <a:spcBef>
+                <a:spcPts val="500"/>
+              </a:spcBef>
+              <a:buFont typeface="Arial" panose="020B0604020202020204" pitchFamily="34" charset="0"/>
+              <a:buChar char="•"/>
+              <a:defRPr sz="1800" kern="1200">
+                <a:solidFill>
+                  <a:schemeClr val="tx1"/>
+                </a:solidFill>
+                <a:latin typeface="+mn-lt"/>
+                <a:ea typeface="+mn-ea"/>
+                <a:cs typeface="+mn-cs"/>
+              </a:defRPr>
+            </a:lvl5pPr>
+            <a:lvl6pPr marL="2514600" indent="-228600" algn="l" defTabSz="914400" rtl="0" eaLnBrk="1" latinLnBrk="0" hangingPunct="1">
+              <a:lnSpc>
+                <a:spcPct val="90000"/>
+              </a:lnSpc>
+              <a:spcBef>
+                <a:spcPts val="500"/>
+              </a:spcBef>
+              <a:buFont typeface="Arial" panose="020B0604020202020204" pitchFamily="34" charset="0"/>
+              <a:buChar char="•"/>
+              <a:defRPr sz="1800" kern="1200">
+                <a:solidFill>
+                  <a:schemeClr val="tx1"/>
+                </a:solidFill>
+                <a:latin typeface="+mn-lt"/>
+                <a:ea typeface="+mn-ea"/>
+                <a:cs typeface="+mn-cs"/>
+              </a:defRPr>
+            </a:lvl6pPr>
+            <a:lvl7pPr marL="2971800" indent="-228600" algn="l" defTabSz="914400" rtl="0" eaLnBrk="1" latinLnBrk="0" hangingPunct="1">
+              <a:lnSpc>
+                <a:spcPct val="90000"/>
+              </a:lnSpc>
+              <a:spcBef>
+                <a:spcPts val="500"/>
+              </a:spcBef>
+              <a:buFont typeface="Arial" panose="020B0604020202020204" pitchFamily="34" charset="0"/>
+              <a:buChar char="•"/>
+              <a:defRPr sz="1800" kern="1200">
+                <a:solidFill>
+                  <a:schemeClr val="tx1"/>
+                </a:solidFill>
+                <a:latin typeface="+mn-lt"/>
+                <a:ea typeface="+mn-ea"/>
+                <a:cs typeface="+mn-cs"/>
+              </a:defRPr>
+            </a:lvl7pPr>
+            <a:lvl8pPr marL="3429000" indent="-228600" algn="l" defTabSz="914400" rtl="0" eaLnBrk="1" latinLnBrk="0" hangingPunct="1">
+              <a:lnSpc>
+                <a:spcPct val="90000"/>
+              </a:lnSpc>
+              <a:spcBef>
+                <a:spcPts val="500"/>
+              </a:spcBef>
+              <a:buFont typeface="Arial" panose="020B0604020202020204" pitchFamily="34" charset="0"/>
+              <a:buChar char="•"/>
+              <a:defRPr sz="1800" kern="1200">
+                <a:solidFill>
+                  <a:schemeClr val="tx1"/>
+                </a:solidFill>
+                <a:latin typeface="+mn-lt"/>
+                <a:ea typeface="+mn-ea"/>
+                <a:cs typeface="+mn-cs"/>
+              </a:defRPr>
+            </a:lvl8pPr>
+            <a:lvl9pPr marL="3886200" indent="-228600" algn="l" defTabSz="914400" rtl="0" eaLnBrk="1" latinLnBrk="0" hangingPunct="1">
+              <a:lnSpc>
+                <a:spcPct val="90000"/>
+              </a:lnSpc>
+              <a:spcBef>
+                <a:spcPts val="500"/>
+              </a:spcBef>
+              <a:buFont typeface="Arial" panose="020B0604020202020204" pitchFamily="34" charset="0"/>
+              <a:buChar char="•"/>
+              <a:defRPr sz="1800" kern="1200">
+                <a:solidFill>
+                  <a:schemeClr val="tx1"/>
+                </a:solidFill>
+                <a:latin typeface="+mn-lt"/>
+                <a:ea typeface="+mn-ea"/>
+                <a:cs typeface="+mn-cs"/>
+              </a:defRPr>
+            </a:lvl9pPr>
+          </a:lstStyle>
+          <a:p>
+            <a:r>
+              <a:rPr lang="de-DE" dirty="0"/>
+              <a:t>Project Setup </a:t>
+            </a:r>
+            <a:r>
+              <a:rPr lang="de-DE" dirty="0" err="1"/>
+              <a:t>Git</a:t>
+            </a:r>
+            <a:r>
+              <a:rPr lang="de-DE" dirty="0"/>
+              <a:t>, LFS &amp; Unity ✅</a:t>
+            </a:r>
+          </a:p>
+          <a:p>
+            <a:r>
+              <a:rPr lang="de-DE" dirty="0"/>
+              <a:t>First Chunk Generation ✅</a:t>
+            </a:r>
+          </a:p>
+          <a:p>
+            <a:r>
+              <a:rPr lang="de-DE" dirty="0"/>
+              <a:t>Rough MC Implementation </a:t>
+            </a:r>
+            <a:r>
+              <a:rPr lang="de-DE" dirty="0" err="1"/>
+              <a:t>with</a:t>
+            </a:r>
+            <a:r>
+              <a:rPr lang="de-DE" dirty="0"/>
+              <a:t> </a:t>
+            </a:r>
+            <a:r>
+              <a:rPr lang="de-DE" dirty="0" err="1"/>
+              <a:t>Compute</a:t>
+            </a:r>
+            <a:r>
+              <a:rPr lang="de-DE" dirty="0"/>
+              <a:t> Shader ✅</a:t>
+            </a:r>
+          </a:p>
+          <a:p>
+            <a:endParaRPr lang="de-DE" dirty="0"/>
+          </a:p>
+          <a:p>
+            <a:r>
+              <a:rPr lang="de-DE" b="1" dirty="0"/>
+              <a:t>Next </a:t>
+            </a:r>
+            <a:r>
+              <a:rPr lang="de-DE" b="1" dirty="0" err="1"/>
+              <a:t>steps</a:t>
+            </a:r>
+            <a:r>
+              <a:rPr lang="de-DE" dirty="0"/>
+              <a:t>: Terrain Material, </a:t>
+            </a:r>
+            <a:r>
+              <a:rPr lang="de-DE" b="1" dirty="0" err="1"/>
+              <a:t>work</a:t>
+            </a:r>
+            <a:r>
+              <a:rPr lang="de-DE" b="1" dirty="0"/>
+              <a:t> on Density </a:t>
+            </a:r>
+            <a:r>
+              <a:rPr lang="de-DE" b="1" dirty="0" err="1"/>
+              <a:t>Function</a:t>
+            </a:r>
+            <a:r>
+              <a:rPr lang="de-DE" b="1" dirty="0"/>
+              <a:t> </a:t>
+            </a:r>
+            <a:r>
+              <a:rPr lang="de-DE" dirty="0"/>
+              <a:t>(</a:t>
+            </a:r>
+            <a:r>
+              <a:rPr lang="de-DE" dirty="0" err="1"/>
+              <a:t>implement</a:t>
+            </a:r>
+            <a:r>
+              <a:rPr lang="de-DE" dirty="0"/>
+              <a:t> </a:t>
+            </a:r>
+            <a:r>
+              <a:rPr lang="de-DE" dirty="0" err="1"/>
+              <a:t>constraints</a:t>
+            </a:r>
+            <a:r>
+              <a:rPr lang="de-DE" dirty="0"/>
+              <a:t> </a:t>
+            </a:r>
+            <a:r>
+              <a:rPr lang="de-DE" dirty="0" err="1"/>
+              <a:t>that</a:t>
+            </a:r>
+            <a:r>
+              <a:rPr lang="de-DE" dirty="0"/>
+              <a:t> </a:t>
+            </a:r>
+            <a:r>
+              <a:rPr lang="de-DE" dirty="0" err="1"/>
+              <a:t>are</a:t>
+            </a:r>
+            <a:r>
+              <a:rPr lang="de-DE" dirty="0"/>
+              <a:t> plausible, </a:t>
+            </a:r>
+            <a:r>
+              <a:rPr lang="de-DE" dirty="0" err="1"/>
+              <a:t>user</a:t>
+            </a:r>
+            <a:r>
+              <a:rPr lang="de-DE" dirty="0"/>
+              <a:t> </a:t>
+            </a:r>
+            <a:r>
+              <a:rPr lang="de-DE" dirty="0" err="1"/>
+              <a:t>parameters</a:t>
+            </a:r>
+            <a:r>
+              <a:rPr lang="de-DE" dirty="0"/>
+              <a:t>), Chunk </a:t>
+            </a:r>
+            <a:r>
+              <a:rPr lang="de-DE" dirty="0" err="1"/>
+              <a:t>saving</a:t>
+            </a:r>
+            <a:r>
+              <a:rPr lang="de-DE" dirty="0"/>
+              <a:t> and </a:t>
+            </a:r>
+            <a:r>
+              <a:rPr lang="de-DE" dirty="0" err="1"/>
+              <a:t>loading</a:t>
+            </a:r>
+            <a:r>
+              <a:rPr lang="de-DE" dirty="0"/>
+              <a:t>…</a:t>
+            </a:r>
+          </a:p>
+          <a:p>
+            <a:endParaRPr lang="de-DE" dirty="0"/>
+          </a:p>
+        </p:txBody>
+      </p:sp>
+    </p:spTree>
+    <p:extLst>
+      <p:ext uri="{BB962C8B-B14F-4D97-AF65-F5344CB8AC3E}">
+        <p14:creationId xmlns:p14="http://schemas.microsoft.com/office/powerpoint/2010/main" val="4039965536"/>
+      </p:ext>
+    </p:extLst>
+  </p:cSld>
+  <p:clrMapOvr>
+    <a:masterClrMapping/>
+  </p:clrMapOvr>
+</p:sld>
+</file>
+
 <file path=ppt/theme/theme1.xml><?xml version="1.0" encoding="utf-8"?>
 <a:theme xmlns:a="http://schemas.openxmlformats.org/drawingml/2006/main" name="GradientUnivers">
   <a:themeElements>
@@ -22637,21 +23103,21 @@
 </file>
 
 <file path=customXml/item1.xml><?xml version="1.0" encoding="utf-8"?>
+<?mso-contentType ?>
+<FormTemplates xmlns="http://schemas.microsoft.com/sharepoint/v3/contenttype/forms">
+  <Display>DocumentLibraryForm</Display>
+  <Edit>DocumentLibraryForm</Edit>
+  <New>DocumentLibraryForm</New>
+</FormTemplates>
+</file>
+
+<file path=customXml/item2.xml><?xml version="1.0" encoding="utf-8"?>
 <p:properties xmlns:p="http://schemas.microsoft.com/office/2006/metadata/properties" xmlns:xsi="http://www.w3.org/2001/XMLSchema-instance" xmlns:pc="http://schemas.microsoft.com/office/infopath/2007/PartnerControls">
   <documentManagement>
     <Status xmlns="71af3243-3dd4-4a8d-8c0d-dd76da1f02a5">Not started</Status>
     <MediaServiceKeyPoints xmlns="71af3243-3dd4-4a8d-8c0d-dd76da1f02a5" xsi:nil="true"/>
   </documentManagement>
 </p:properties>
-</file>
-
-<file path=customXml/item2.xml><?xml version="1.0" encoding="utf-8"?>
-<?mso-contentType ?>
-<FormTemplates xmlns="http://schemas.microsoft.com/sharepoint/v3/contenttype/forms">
-  <Display>DocumentLibraryForm</Display>
-  <Edit>DocumentLibraryForm</Edit>
-  <New>DocumentLibraryForm</New>
-</FormTemplates>
 </file>
 
 <file path=customXml/item3.xml><?xml version="1.0" encoding="utf-8"?>
@@ -22876,19 +23342,19 @@
 </file>
 
 <file path=customXml/itemProps1.xml><?xml version="1.0" encoding="utf-8"?>
+<ds:datastoreItem xmlns:ds="http://schemas.openxmlformats.org/officeDocument/2006/customXml" ds:itemID="{3C8E00D1-8EA3-4E42-801D-0253E1EAFC21}">
+  <ds:schemaRefs>
+    <ds:schemaRef ds:uri="http://schemas.microsoft.com/sharepoint/v3/contenttype/forms"/>
+  </ds:schemaRefs>
+</ds:datastoreItem>
+</file>
+
+<file path=customXml/itemProps2.xml><?xml version="1.0" encoding="utf-8"?>
 <ds:datastoreItem xmlns:ds="http://schemas.openxmlformats.org/officeDocument/2006/customXml" ds:itemID="{99919F73-B6C2-4A43-95E2-833EC48925FE}">
   <ds:schemaRefs>
     <ds:schemaRef ds:uri="http://schemas.microsoft.com/office/2006/metadata/properties"/>
     <ds:schemaRef ds:uri="http://schemas.microsoft.com/office/infopath/2007/PartnerControls"/>
     <ds:schemaRef ds:uri="71af3243-3dd4-4a8d-8c0d-dd76da1f02a5"/>
-  </ds:schemaRefs>
-</ds:datastoreItem>
-</file>
-
-<file path=customXml/itemProps2.xml><?xml version="1.0" encoding="utf-8"?>
-<ds:datastoreItem xmlns:ds="http://schemas.openxmlformats.org/officeDocument/2006/customXml" ds:itemID="{3C8E00D1-8EA3-4E42-801D-0253E1EAFC21}">
-  <ds:schemaRefs>
-    <ds:schemaRef ds:uri="http://schemas.microsoft.com/sharepoint/v3/contenttype/forms"/>
   </ds:schemaRefs>
 </ds:datastoreItem>
 </file>

</xml_diff>

<commit_message>
Added quick Terrain Coloring for presentation
</commit_message>
<xml_diff>
--- a/Computergrafik Praktikum.pptx
+++ b/Computergrafik Praktikum.pptx
@@ -5,10 +5,10 @@
     <p:sldMasterId id="2147483696" r:id="rId4"/>
   </p:sldMasterIdLst>
   <p:notesMasterIdLst>
-    <p:notesMasterId r:id="rId13"/>
+    <p:notesMasterId r:id="rId14"/>
   </p:notesMasterIdLst>
   <p:handoutMasterIdLst>
-    <p:handoutMasterId r:id="rId14"/>
+    <p:handoutMasterId r:id="rId15"/>
   </p:handoutMasterIdLst>
   <p:sldIdLst>
     <p:sldId id="306" r:id="rId5"/>
@@ -18,7 +18,8 @@
     <p:sldId id="311" r:id="rId9"/>
     <p:sldId id="312" r:id="rId10"/>
     <p:sldId id="313" r:id="rId11"/>
-    <p:sldId id="314" r:id="rId12"/>
+    <p:sldId id="315" r:id="rId12"/>
+    <p:sldId id="314" r:id="rId13"/>
   </p:sldIdLst>
   <p:sldSz cx="12192000" cy="6858000"/>
   <p:notesSz cx="6858000" cy="9144000"/>
@@ -9274,7 +9275,7 @@
           <a:p>
             <a:fld id="{67702A17-7AE3-4B44-889C-4D77A0FC7177}" type="datetime1">
               <a:rPr lang="de-DE" smtClean="0"/>
-              <a:t>02.12.2022</a:t>
+              <a:t>16.12.2022</a:t>
             </a:fld>
             <a:endParaRPr lang="de-DE" dirty="0"/>
           </a:p>
@@ -9454,7 +9455,7 @@
             <a:fld id="{82650ACC-C7DD-445E-BC27-71FC31906D7B}" type="datetime1">
               <a:rPr lang="de-DE" smtClean="0"/>
               <a:pPr/>
-              <a:t>02.12.2022</a:t>
+              <a:t>16.12.2022</a:t>
             </a:fld>
             <a:endParaRPr lang="de-DE" dirty="0"/>
           </a:p>
@@ -22353,13 +22354,45 @@
           <a:lstStyle/>
           <a:p>
             <a:r>
-              <a:rPr lang="de-DE" sz="4800" dirty="0" err="1"/>
-              <a:t>Upcoming</a:t>
-            </a:r>
-            <a:r>
-              <a:rPr lang="de-DE" sz="4800" dirty="0"/>
-              <a:t> Features</a:t>
-            </a:r>
+              <a:rPr lang="de-DE" dirty="0"/>
+              <a:t>Meeting </a:t>
+            </a:r>
+            <a:r>
+              <a:rPr lang="de-DE" dirty="0" err="1"/>
+              <a:t>No</a:t>
+            </a:r>
+            <a:r>
+              <a:rPr lang="de-DE" dirty="0"/>
+              <a:t>. 02 20.12.22</a:t>
+            </a:r>
+          </a:p>
+        </p:txBody>
+      </p:sp>
+      <p:sp>
+        <p:nvSpPr>
+          <p:cNvPr id="3" name="Inhaltsplatzhalter 2">
+            <a:extLst>
+              <a:ext uri="{FF2B5EF4-FFF2-40B4-BE49-F238E27FC236}">
+                <a16:creationId xmlns:a16="http://schemas.microsoft.com/office/drawing/2014/main" id="{8104E86C-6562-3D59-6B1F-1109F282E63C}"/>
+              </a:ext>
+            </a:extLst>
+          </p:cNvPr>
+          <p:cNvSpPr>
+            <a:spLocks noGrp="1"/>
+          </p:cNvSpPr>
+          <p:nvPr>
+            <p:ph idx="1"/>
+          </p:nvPr>
+        </p:nvSpPr>
+        <p:spPr/>
+        <p:txBody>
+          <a:bodyPr/>
+          <a:lstStyle/>
+          <a:p>
+            <a:endParaRPr lang="de-DE" dirty="0"/>
+          </a:p>
+          <a:p>
+            <a:endParaRPr lang="de-DE" dirty="0"/>
           </a:p>
         </p:txBody>
       </p:sp>
@@ -22586,6 +22619,436 @@
           </a:lstStyle>
           <a:p>
             <a:r>
+              <a:rPr lang="de-DE" sz="2800" dirty="0" err="1"/>
+              <a:t>Improved</a:t>
+            </a:r>
+            <a:r>
+              <a:rPr lang="de-DE" sz="2800" dirty="0"/>
+              <a:t> Density </a:t>
+            </a:r>
+            <a:r>
+              <a:rPr lang="de-DE" sz="2800" dirty="0" err="1"/>
+              <a:t>Function</a:t>
+            </a:r>
+            <a:r>
+              <a:rPr lang="de-DE" sz="2800" dirty="0"/>
+              <a:t> </a:t>
+            </a:r>
+            <a:r>
+              <a:rPr lang="de-DE" dirty="0"/>
+              <a:t>✅</a:t>
+            </a:r>
+          </a:p>
+          <a:p>
+            <a:pPr lvl="1"/>
+            <a:r>
+              <a:rPr lang="de-DE" dirty="0"/>
+              <a:t>2D / 3D Noise </a:t>
+            </a:r>
+            <a:r>
+              <a:rPr lang="de-DE" dirty="0" err="1"/>
+              <a:t>option</a:t>
+            </a:r>
+            <a:endParaRPr lang="de-DE" dirty="0"/>
+          </a:p>
+          <a:p>
+            <a:pPr lvl="1"/>
+            <a:r>
+              <a:rPr lang="de-DE" dirty="0" err="1"/>
+              <a:t>user</a:t>
+            </a:r>
+            <a:r>
+              <a:rPr lang="de-DE" dirty="0"/>
+              <a:t> </a:t>
+            </a:r>
+            <a:r>
+              <a:rPr lang="de-DE" dirty="0" err="1"/>
+              <a:t>chosen</a:t>
+            </a:r>
+            <a:r>
+              <a:rPr lang="de-DE" dirty="0"/>
+              <a:t> </a:t>
+            </a:r>
+            <a:r>
+              <a:rPr lang="de-DE" dirty="0" err="1"/>
+              <a:t>frequencies</a:t>
+            </a:r>
+            <a:endParaRPr lang="de-DE" dirty="0"/>
+          </a:p>
+          <a:p>
+            <a:pPr lvl="1"/>
+            <a:r>
+              <a:rPr lang="de-DE" dirty="0" err="1"/>
+              <a:t>octave</a:t>
+            </a:r>
+            <a:r>
+              <a:rPr lang="de-DE" dirty="0"/>
+              <a:t> </a:t>
+            </a:r>
+            <a:r>
+              <a:rPr lang="de-DE" dirty="0" err="1"/>
+              <a:t>levels</a:t>
+            </a:r>
+            <a:endParaRPr lang="de-DE" dirty="0"/>
+          </a:p>
+          <a:p>
+            <a:pPr lvl="1"/>
+            <a:endParaRPr lang="de-DE" dirty="0"/>
+          </a:p>
+          <a:p>
+            <a:r>
+              <a:rPr lang="de-DE" dirty="0"/>
+              <a:t>Chunk </a:t>
+            </a:r>
+            <a:r>
+              <a:rPr lang="de-DE" dirty="0" err="1"/>
+              <a:t>management</a:t>
+            </a:r>
+            <a:r>
+              <a:rPr lang="de-DE" dirty="0"/>
+              <a:t> ✅</a:t>
+            </a:r>
+          </a:p>
+          <a:p>
+            <a:pPr lvl="1"/>
+            <a:r>
+              <a:rPr lang="de-DE" dirty="0" err="1"/>
+              <a:t>propagate</a:t>
+            </a:r>
+            <a:r>
+              <a:rPr lang="de-DE" dirty="0"/>
+              <a:t> </a:t>
+            </a:r>
+            <a:r>
+              <a:rPr lang="de-DE" dirty="0" err="1"/>
+              <a:t>noise</a:t>
+            </a:r>
+            <a:r>
+              <a:rPr lang="de-DE" dirty="0"/>
+              <a:t> </a:t>
+            </a:r>
+            <a:r>
+              <a:rPr lang="de-DE" dirty="0" err="1"/>
+              <a:t>across</a:t>
+            </a:r>
+            <a:r>
+              <a:rPr lang="de-DE" dirty="0"/>
+              <a:t> </a:t>
+            </a:r>
+            <a:r>
+              <a:rPr lang="de-DE" dirty="0" err="1"/>
+              <a:t>chunks</a:t>
+            </a:r>
+            <a:endParaRPr lang="de-DE" dirty="0"/>
+          </a:p>
+          <a:p>
+            <a:pPr lvl="1"/>
+            <a:r>
+              <a:rPr lang="de-DE" dirty="0" err="1"/>
+              <a:t>chunk</a:t>
+            </a:r>
+            <a:r>
+              <a:rPr lang="de-DE" dirty="0"/>
+              <a:t> holder </a:t>
+            </a:r>
+            <a:r>
+              <a:rPr lang="de-DE" dirty="0" err="1"/>
+              <a:t>structure</a:t>
+            </a:r>
+            <a:endParaRPr lang="de-DE" sz="2800" dirty="0"/>
+          </a:p>
+          <a:p>
+            <a:endParaRPr lang="de-DE" sz="2800" dirty="0"/>
+          </a:p>
+        </p:txBody>
+      </p:sp>
+    </p:spTree>
+    <p:extLst>
+      <p:ext uri="{BB962C8B-B14F-4D97-AF65-F5344CB8AC3E}">
+        <p14:creationId xmlns:p14="http://schemas.microsoft.com/office/powerpoint/2010/main" val="4194388649"/>
+      </p:ext>
+    </p:extLst>
+  </p:cSld>
+  <p:clrMapOvr>
+    <a:masterClrMapping/>
+  </p:clrMapOvr>
+</p:sld>
+</file>
+
+<file path=ppt/slides/slide9.xml><?xml version="1.0" encoding="utf-8"?>
+<p:sld xmlns:a="http://schemas.openxmlformats.org/drawingml/2006/main" xmlns:r="http://schemas.openxmlformats.org/officeDocument/2006/relationships" xmlns:p="http://schemas.openxmlformats.org/presentationml/2006/main">
+  <p:cSld>
+    <p:spTree>
+      <p:nvGrpSpPr>
+        <p:cNvPr id="1" name=""/>
+        <p:cNvGrpSpPr/>
+        <p:nvPr/>
+      </p:nvGrpSpPr>
+      <p:grpSpPr>
+        <a:xfrm>
+          <a:off x="0" y="0"/>
+          <a:ext cx="0" cy="0"/>
+          <a:chOff x="0" y="0"/>
+          <a:chExt cx="0" cy="0"/>
+        </a:xfrm>
+      </p:grpSpPr>
+      <p:sp>
+        <p:nvSpPr>
+          <p:cNvPr id="2" name="Titel 1">
+            <a:extLst>
+              <a:ext uri="{FF2B5EF4-FFF2-40B4-BE49-F238E27FC236}">
+                <a16:creationId xmlns:a16="http://schemas.microsoft.com/office/drawing/2014/main" id="{6486B241-B0F4-3C41-A754-3621162A5DF3}"/>
+              </a:ext>
+            </a:extLst>
+          </p:cNvPr>
+          <p:cNvSpPr>
+            <a:spLocks noGrp="1"/>
+          </p:cNvSpPr>
+          <p:nvPr>
+            <p:ph type="title"/>
+          </p:nvPr>
+        </p:nvSpPr>
+        <p:spPr/>
+        <p:txBody>
+          <a:bodyPr>
+            <a:normAutofit/>
+          </a:bodyPr>
+          <a:lstStyle/>
+          <a:p>
+            <a:r>
+              <a:rPr lang="de-DE" sz="4800" dirty="0" err="1"/>
+              <a:t>Upcoming</a:t>
+            </a:r>
+            <a:r>
+              <a:rPr lang="de-DE" sz="4800" dirty="0"/>
+              <a:t> Features</a:t>
+            </a:r>
+          </a:p>
+        </p:txBody>
+      </p:sp>
+      <p:sp>
+        <p:nvSpPr>
+          <p:cNvPr id="4" name="Foliennummernplatzhalter 3">
+            <a:extLst>
+              <a:ext uri="{FF2B5EF4-FFF2-40B4-BE49-F238E27FC236}">
+                <a16:creationId xmlns:a16="http://schemas.microsoft.com/office/drawing/2014/main" id="{112574EA-713E-A19F-F991-1F9FF7E43A83}"/>
+              </a:ext>
+            </a:extLst>
+          </p:cNvPr>
+          <p:cNvSpPr>
+            <a:spLocks noGrp="1"/>
+          </p:cNvSpPr>
+          <p:nvPr>
+            <p:ph type="sldNum" sz="quarter" idx="12"/>
+          </p:nvPr>
+        </p:nvSpPr>
+        <p:spPr/>
+        <p:txBody>
+          <a:bodyPr/>
+          <a:lstStyle/>
+          <a:p>
+            <a:pPr rtl="0"/>
+            <a:fld id="{D8DA9DAA-006C-4F4B-980E-E3DF019B24E2}" type="slidenum">
+              <a:rPr lang="de-DE" noProof="0" smtClean="0"/>
+              <a:t>9</a:t>
+            </a:fld>
+            <a:endParaRPr lang="de-DE" noProof="0"/>
+          </a:p>
+        </p:txBody>
+      </p:sp>
+      <p:sp>
+        <p:nvSpPr>
+          <p:cNvPr id="5" name="Inhaltsplatzhalter 2">
+            <a:extLst>
+              <a:ext uri="{FF2B5EF4-FFF2-40B4-BE49-F238E27FC236}">
+                <a16:creationId xmlns:a16="http://schemas.microsoft.com/office/drawing/2014/main" id="{A4760D2C-3B03-E7F3-E9BC-3DBCD16C5035}"/>
+              </a:ext>
+            </a:extLst>
+          </p:cNvPr>
+          <p:cNvSpPr txBox="1">
+            <a:spLocks/>
+          </p:cNvSpPr>
+          <p:nvPr/>
+        </p:nvSpPr>
+        <p:spPr>
+          <a:xfrm>
+            <a:off x="990600" y="1978025"/>
+            <a:ext cx="10515600" cy="4351338"/>
+          </a:xfrm>
+          <a:prstGeom prst="rect">
+            <a:avLst/>
+          </a:prstGeom>
+        </p:spPr>
+        <p:txBody>
+          <a:bodyPr vert="horz" lIns="91440" tIns="45720" rIns="91440" bIns="45720" rtlCol="0">
+            <a:normAutofit/>
+          </a:bodyPr>
+          <a:lstStyle>
+            <a:lvl1pPr marL="228600" indent="-228600" algn="l" defTabSz="914400" rtl="0" eaLnBrk="1" latinLnBrk="0" hangingPunct="1">
+              <a:lnSpc>
+                <a:spcPct val="90000"/>
+              </a:lnSpc>
+              <a:spcBef>
+                <a:spcPts val="1000"/>
+              </a:spcBef>
+              <a:buFont typeface="Arial" panose="020B0604020202020204" pitchFamily="34" charset="0"/>
+              <a:buChar char="•"/>
+              <a:defRPr sz="2800" kern="1200">
+                <a:solidFill>
+                  <a:schemeClr val="tx1"/>
+                </a:solidFill>
+                <a:latin typeface="+mn-lt"/>
+                <a:ea typeface="+mn-ea"/>
+                <a:cs typeface="+mn-cs"/>
+              </a:defRPr>
+            </a:lvl1pPr>
+            <a:lvl2pPr marL="685800" indent="-228600" algn="l" defTabSz="914400" rtl="0" eaLnBrk="1" latinLnBrk="0" hangingPunct="1">
+              <a:lnSpc>
+                <a:spcPct val="90000"/>
+              </a:lnSpc>
+              <a:spcBef>
+                <a:spcPts val="500"/>
+              </a:spcBef>
+              <a:buFont typeface="Arial" panose="020B0604020202020204" pitchFamily="34" charset="0"/>
+              <a:buChar char="•"/>
+              <a:defRPr sz="2400" kern="1200">
+                <a:solidFill>
+                  <a:schemeClr val="tx1"/>
+                </a:solidFill>
+                <a:latin typeface="+mn-lt"/>
+                <a:ea typeface="+mn-ea"/>
+                <a:cs typeface="+mn-cs"/>
+              </a:defRPr>
+            </a:lvl2pPr>
+            <a:lvl3pPr marL="1143000" indent="-228600" algn="l" defTabSz="914400" rtl="0" eaLnBrk="1" latinLnBrk="0" hangingPunct="1">
+              <a:lnSpc>
+                <a:spcPct val="90000"/>
+              </a:lnSpc>
+              <a:spcBef>
+                <a:spcPts val="500"/>
+              </a:spcBef>
+              <a:buFont typeface="Arial" panose="020B0604020202020204" pitchFamily="34" charset="0"/>
+              <a:buChar char="•"/>
+              <a:defRPr sz="2000" kern="1200">
+                <a:solidFill>
+                  <a:schemeClr val="tx1"/>
+                </a:solidFill>
+                <a:latin typeface="+mn-lt"/>
+                <a:ea typeface="+mn-ea"/>
+                <a:cs typeface="+mn-cs"/>
+              </a:defRPr>
+            </a:lvl3pPr>
+            <a:lvl4pPr marL="1600200" indent="-228600" algn="l" defTabSz="914400" rtl="0" eaLnBrk="1" latinLnBrk="0" hangingPunct="1">
+              <a:lnSpc>
+                <a:spcPct val="90000"/>
+              </a:lnSpc>
+              <a:spcBef>
+                <a:spcPts val="500"/>
+              </a:spcBef>
+              <a:buFont typeface="Arial" panose="020B0604020202020204" pitchFamily="34" charset="0"/>
+              <a:buChar char="•"/>
+              <a:defRPr sz="1800" kern="1200">
+                <a:solidFill>
+                  <a:schemeClr val="tx1"/>
+                </a:solidFill>
+                <a:latin typeface="+mn-lt"/>
+                <a:ea typeface="+mn-ea"/>
+                <a:cs typeface="+mn-cs"/>
+              </a:defRPr>
+            </a:lvl4pPr>
+            <a:lvl5pPr marL="2057400" indent="-228600" algn="l" defTabSz="914400" rtl="0" eaLnBrk="1" latinLnBrk="0" hangingPunct="1">
+              <a:lnSpc>
+                <a:spcPct val="90000"/>
+              </a:lnSpc>
+              <a:spcBef>
+                <a:spcPts val="500"/>
+              </a:spcBef>
+              <a:buFont typeface="Arial" panose="020B0604020202020204" pitchFamily="34" charset="0"/>
+              <a:buChar char="•"/>
+              <a:defRPr sz="1800" kern="1200">
+                <a:solidFill>
+                  <a:schemeClr val="tx1"/>
+                </a:solidFill>
+                <a:latin typeface="+mn-lt"/>
+                <a:ea typeface="+mn-ea"/>
+                <a:cs typeface="+mn-cs"/>
+              </a:defRPr>
+            </a:lvl5pPr>
+            <a:lvl6pPr marL="2514600" indent="-228600" algn="l" defTabSz="914400" rtl="0" eaLnBrk="1" latinLnBrk="0" hangingPunct="1">
+              <a:lnSpc>
+                <a:spcPct val="90000"/>
+              </a:lnSpc>
+              <a:spcBef>
+                <a:spcPts val="500"/>
+              </a:spcBef>
+              <a:buFont typeface="Arial" panose="020B0604020202020204" pitchFamily="34" charset="0"/>
+              <a:buChar char="•"/>
+              <a:defRPr sz="1800" kern="1200">
+                <a:solidFill>
+                  <a:schemeClr val="tx1"/>
+                </a:solidFill>
+                <a:latin typeface="+mn-lt"/>
+                <a:ea typeface="+mn-ea"/>
+                <a:cs typeface="+mn-cs"/>
+              </a:defRPr>
+            </a:lvl6pPr>
+            <a:lvl7pPr marL="2971800" indent="-228600" algn="l" defTabSz="914400" rtl="0" eaLnBrk="1" latinLnBrk="0" hangingPunct="1">
+              <a:lnSpc>
+                <a:spcPct val="90000"/>
+              </a:lnSpc>
+              <a:spcBef>
+                <a:spcPts val="500"/>
+              </a:spcBef>
+              <a:buFont typeface="Arial" panose="020B0604020202020204" pitchFamily="34" charset="0"/>
+              <a:buChar char="•"/>
+              <a:defRPr sz="1800" kern="1200">
+                <a:solidFill>
+                  <a:schemeClr val="tx1"/>
+                </a:solidFill>
+                <a:latin typeface="+mn-lt"/>
+                <a:ea typeface="+mn-ea"/>
+                <a:cs typeface="+mn-cs"/>
+              </a:defRPr>
+            </a:lvl7pPr>
+            <a:lvl8pPr marL="3429000" indent="-228600" algn="l" defTabSz="914400" rtl="0" eaLnBrk="1" latinLnBrk="0" hangingPunct="1">
+              <a:lnSpc>
+                <a:spcPct val="90000"/>
+              </a:lnSpc>
+              <a:spcBef>
+                <a:spcPts val="500"/>
+              </a:spcBef>
+              <a:buFont typeface="Arial" panose="020B0604020202020204" pitchFamily="34" charset="0"/>
+              <a:buChar char="•"/>
+              <a:defRPr sz="1800" kern="1200">
+                <a:solidFill>
+                  <a:schemeClr val="tx1"/>
+                </a:solidFill>
+                <a:latin typeface="+mn-lt"/>
+                <a:ea typeface="+mn-ea"/>
+                <a:cs typeface="+mn-cs"/>
+              </a:defRPr>
+            </a:lvl8pPr>
+            <a:lvl9pPr marL="3886200" indent="-228600" algn="l" defTabSz="914400" rtl="0" eaLnBrk="1" latinLnBrk="0" hangingPunct="1">
+              <a:lnSpc>
+                <a:spcPct val="90000"/>
+              </a:lnSpc>
+              <a:spcBef>
+                <a:spcPts val="500"/>
+              </a:spcBef>
+              <a:buFont typeface="Arial" panose="020B0604020202020204" pitchFamily="34" charset="0"/>
+              <a:buChar char="•"/>
+              <a:defRPr sz="1800" kern="1200">
+                <a:solidFill>
+                  <a:schemeClr val="tx1"/>
+                </a:solidFill>
+                <a:latin typeface="+mn-lt"/>
+                <a:ea typeface="+mn-ea"/>
+                <a:cs typeface="+mn-cs"/>
+              </a:defRPr>
+            </a:lvl9pPr>
+          </a:lstStyle>
+          <a:p>
+            <a:r>
               <a:rPr lang="de-DE" sz="2400" b="1" dirty="0" err="1"/>
               <a:t>Improved</a:t>
             </a:r>
@@ -22599,11 +23062,25 @@
             </a:r>
             <a:r>
               <a:rPr lang="de-DE" sz="2400" b="1" dirty="0"/>
-              <a:t> (Noise </a:t>
+              <a:t> (Threshold, Noise </a:t>
             </a:r>
             <a:r>
               <a:rPr lang="de-DE" sz="2400" b="1" dirty="0" err="1"/>
-              <a:t>with</a:t>
+              <a:t>improvements</a:t>
+            </a:r>
+            <a:r>
+              <a:rPr lang="de-DE" sz="2400" b="1" dirty="0"/>
+              <a:t>?)</a:t>
+            </a:r>
+          </a:p>
+          <a:p>
+            <a:r>
+              <a:rPr lang="de-DE" sz="2400" b="1" dirty="0"/>
+              <a:t>Chunk Management (LODs, </a:t>
+            </a:r>
+            <a:r>
+              <a:rPr lang="de-DE" sz="2400" b="1" dirty="0" err="1"/>
+              <a:t>draw</a:t>
             </a:r>
             <a:r>
               <a:rPr lang="de-DE" sz="2400" b="1" dirty="0"/>
@@ -22611,61 +23088,44 @@
             </a:r>
             <a:r>
               <a:rPr lang="de-DE" sz="2400" b="1" dirty="0" err="1"/>
-              <a:t>seed</a:t>
+              <a:t>distance</a:t>
             </a:r>
             <a:r>
               <a:rPr lang="de-DE" sz="2400" b="1" dirty="0"/>
-              <a:t>, </a:t>
-            </a:r>
-            <a:r>
-              <a:rPr lang="de-DE" sz="2400" b="1" dirty="0" err="1"/>
-              <a:t>octaves</a:t>
-            </a:r>
-            <a:r>
-              <a:rPr lang="de-DE" sz="2400" b="1" dirty="0"/>
-              <a:t> …)</a:t>
+              <a:t>)</a:t>
             </a:r>
           </a:p>
           <a:p>
             <a:r>
               <a:rPr lang="de-DE" sz="2400" b="1" dirty="0"/>
-              <a:t>Chunk Management (</a:t>
+              <a:t>Efficiency </a:t>
             </a:r>
             <a:r>
               <a:rPr lang="de-DE" sz="2400" b="1" dirty="0" err="1"/>
-              <a:t>Frustum</a:t>
-            </a:r>
+              <a:t>analysis</a:t>
+            </a:r>
+            <a:endParaRPr lang="de-DE" sz="2400" b="1" dirty="0"/>
+          </a:p>
+          <a:p>
             <a:r>
               <a:rPr lang="de-DE" sz="2400" b="1" dirty="0"/>
-              <a:t> Calling, LODs, </a:t>
+              <a:t>More </a:t>
             </a:r>
             <a:r>
               <a:rPr lang="de-DE" sz="2400" b="1" dirty="0" err="1"/>
-              <a:t>draw</a:t>
+              <a:t>papers</a:t>
             </a:r>
             <a:r>
               <a:rPr lang="de-DE" sz="2400" b="1" dirty="0"/>
               <a:t> </a:t>
             </a:r>
-            <a:r>
-              <a:rPr lang="de-DE" sz="2400" b="1" dirty="0" err="1"/>
-              <a:t>distance</a:t>
-            </a:r>
-            <a:r>
-              <a:rPr lang="de-DE" sz="2400" b="1" dirty="0"/>
-              <a:t>)</a:t>
-            </a:r>
           </a:p>
           <a:p>
-            <a:r>
-              <a:rPr lang="de-DE" sz="2400" b="1" dirty="0"/>
-              <a:t>More </a:t>
-            </a:r>
-            <a:r>
-              <a:rPr lang="de-DE" sz="2400" b="1" dirty="0" err="1"/>
-              <a:t>papers</a:t>
-            </a:r>
-            <a:endParaRPr lang="de-DE" sz="2400" b="1" dirty="0"/>
+            <a:pPr lvl="1"/>
+            <a:r>
+              <a:rPr lang="de-DE" sz="2000" b="1" dirty="0"/>
+              <a:t>Marching Cubes: https://dl.acm.org/doi/10.1145/37402.37422</a:t>
+            </a:r>
           </a:p>
           <a:p>
             <a:r>
@@ -23505,21 +23965,21 @@
 </file>
 
 <file path=customXml/item1.xml><?xml version="1.0" encoding="utf-8"?>
+<p:properties xmlns:p="http://schemas.microsoft.com/office/2006/metadata/properties" xmlns:xsi="http://www.w3.org/2001/XMLSchema-instance" xmlns:pc="http://schemas.microsoft.com/office/infopath/2007/PartnerControls">
+  <documentManagement>
+    <Status xmlns="71af3243-3dd4-4a8d-8c0d-dd76da1f02a5">Not started</Status>
+    <MediaServiceKeyPoints xmlns="71af3243-3dd4-4a8d-8c0d-dd76da1f02a5" xsi:nil="true"/>
+  </documentManagement>
+</p:properties>
+</file>
+
+<file path=customXml/item2.xml><?xml version="1.0" encoding="utf-8"?>
 <?mso-contentType ?>
 <FormTemplates xmlns="http://schemas.microsoft.com/sharepoint/v3/contenttype/forms">
   <Display>DocumentLibraryForm</Display>
   <Edit>DocumentLibraryForm</Edit>
   <New>DocumentLibraryForm</New>
 </FormTemplates>
-</file>
-
-<file path=customXml/item2.xml><?xml version="1.0" encoding="utf-8"?>
-<p:properties xmlns:p="http://schemas.microsoft.com/office/2006/metadata/properties" xmlns:xsi="http://www.w3.org/2001/XMLSchema-instance" xmlns:pc="http://schemas.microsoft.com/office/infopath/2007/PartnerControls">
-  <documentManagement>
-    <Status xmlns="71af3243-3dd4-4a8d-8c0d-dd76da1f02a5">Not started</Status>
-    <MediaServiceKeyPoints xmlns="71af3243-3dd4-4a8d-8c0d-dd76da1f02a5" xsi:nil="true"/>
-  </documentManagement>
-</p:properties>
 </file>
 
 <file path=customXml/item3.xml><?xml version="1.0" encoding="utf-8"?>
@@ -23744,19 +24204,19 @@
 </file>
 
 <file path=customXml/itemProps1.xml><?xml version="1.0" encoding="utf-8"?>
-<ds:datastoreItem xmlns:ds="http://schemas.openxmlformats.org/officeDocument/2006/customXml" ds:itemID="{3C8E00D1-8EA3-4E42-801D-0253E1EAFC21}">
+<ds:datastoreItem xmlns:ds="http://schemas.openxmlformats.org/officeDocument/2006/customXml" ds:itemID="{99919F73-B6C2-4A43-95E2-833EC48925FE}">
   <ds:schemaRefs>
-    <ds:schemaRef ds:uri="http://schemas.microsoft.com/sharepoint/v3/contenttype/forms"/>
+    <ds:schemaRef ds:uri="http://schemas.microsoft.com/office/2006/metadata/properties"/>
+    <ds:schemaRef ds:uri="http://schemas.microsoft.com/office/infopath/2007/PartnerControls"/>
+    <ds:schemaRef ds:uri="71af3243-3dd4-4a8d-8c0d-dd76da1f02a5"/>
   </ds:schemaRefs>
 </ds:datastoreItem>
 </file>
 
 <file path=customXml/itemProps2.xml><?xml version="1.0" encoding="utf-8"?>
-<ds:datastoreItem xmlns:ds="http://schemas.openxmlformats.org/officeDocument/2006/customXml" ds:itemID="{99919F73-B6C2-4A43-95E2-833EC48925FE}">
+<ds:datastoreItem xmlns:ds="http://schemas.openxmlformats.org/officeDocument/2006/customXml" ds:itemID="{3C8E00D1-8EA3-4E42-801D-0253E1EAFC21}">
   <ds:schemaRefs>
-    <ds:schemaRef ds:uri="http://schemas.microsoft.com/office/2006/metadata/properties"/>
-    <ds:schemaRef ds:uri="http://schemas.microsoft.com/office/infopath/2007/PartnerControls"/>
-    <ds:schemaRef ds:uri="71af3243-3dd4-4a8d-8c0d-dd76da1f02a5"/>
+    <ds:schemaRef ds:uri="http://schemas.microsoft.com/sharepoint/v3/contenttype/forms"/>
   </ds:schemaRefs>
 </ds:datastoreItem>
 </file>

</xml_diff>

<commit_message>
Add Camera related Chunk Rendering
</commit_message>
<xml_diff>
--- a/Computergrafik Praktikum.pptx
+++ b/Computergrafik Praktikum.pptx
@@ -5257,6 +5257,13 @@
         <a:p>
           <a:pPr rtl="0"/>
           <a:r>
+            <a:rPr lang="de-DE" sz="1400" b="1" i="0" u="none" noProof="0" dirty="0"/>
+            <a:t>Efficiency Test</a:t>
+          </a:r>
+        </a:p>
+        <a:p>
+          <a:pPr rtl="0"/>
+          <a:r>
             <a:rPr lang="de-DE" sz="1400" b="1" i="0" u="none" noProof="0" dirty="0" err="1"/>
             <a:t>Improve</a:t>
           </a:r>
@@ -5276,6 +5283,26 @@
             <a:rPr lang="de-DE" sz="1400" b="1" i="0" u="none" noProof="0" dirty="0"/>
             <a:t>Chunk LODs</a:t>
           </a:r>
+        </a:p>
+        <a:p>
+          <a:pPr rtl="0"/>
+          <a:r>
+            <a:rPr lang="de-DE" sz="1400" i="1" dirty="0"/>
+            <a:t>smooth normal </a:t>
+          </a:r>
+          <a:r>
+            <a:rPr lang="de-DE" sz="1400" i="1" dirty="0" err="1"/>
+            <a:t>shading</a:t>
+          </a:r>
+          <a:r>
+            <a:rPr lang="de-DE" sz="1400" i="1" dirty="0"/>
+            <a:t> </a:t>
+          </a:r>
+          <a:r>
+            <a:rPr lang="de-DE" sz="1400" i="1" dirty="0" err="1"/>
+            <a:t>test</a:t>
+          </a:r>
+          <a:endParaRPr lang="de-DE" sz="1400" b="1" i="0" u="none" noProof="0" dirty="0"/>
         </a:p>
         <a:p>
           <a:pPr rtl="0"/>
@@ -5371,14 +5398,30 @@
             <a:rPr lang="de-DE" sz="1400" b="1" i="0" u="none" noProof="0" dirty="0" err="1"/>
             <a:t>Presentation</a:t>
           </a:r>
-          <a:br>
-            <a:rPr lang="de-DE" sz="1400" b="1" i="0" u="none" noProof="0" dirty="0"/>
-          </a:br>
-          <a:r>
-            <a:rPr lang="de-DE" sz="1400" b="0" i="0" u="none" noProof="0" dirty="0" err="1"/>
+          <a:endParaRPr lang="de-DE" sz="1400" b="1" i="0" u="none" noProof="0" dirty="0"/>
+        </a:p>
+        <a:p>
+          <a:pPr rtl="0"/>
+          <a:r>
+            <a:rPr lang="de-DE" sz="1400" i="1" dirty="0"/>
+            <a:t>Material </a:t>
+          </a:r>
+          <a:r>
+            <a:rPr lang="de-DE" sz="1400" i="1"/>
+            <a:t>Tweaks</a:t>
+          </a:r>
+        </a:p>
+        <a:p>
+          <a:pPr rtl="0"/>
+          <a:r>
+            <a:rPr lang="de-DE" sz="1400" i="1" dirty="0" err="1"/>
             <a:t>Polishing</a:t>
           </a:r>
-          <a:endParaRPr lang="de-DE" sz="1400" noProof="0" dirty="0"/>
+          <a:endParaRPr lang="de-DE" sz="1400" i="1" dirty="0"/>
+        </a:p>
+        <a:p>
+          <a:pPr rtl="0"/>
+          <a:endParaRPr lang="de-DE" sz="1400" i="1" dirty="0"/>
         </a:p>
       </dgm:t>
     </dgm:pt>
@@ -8850,6 +8893,24 @@
             <a:buNone/>
           </a:pPr>
           <a:r>
+            <a:rPr lang="de-DE" sz="1400" b="1" i="0" u="none" kern="1200" noProof="0" dirty="0"/>
+            <a:t>Efficiency Test</a:t>
+          </a:r>
+        </a:p>
+        <a:p>
+          <a:pPr marL="0" lvl="0" indent="0" algn="l" defTabSz="622300" rtl="0">
+            <a:lnSpc>
+              <a:spcPct val="90000"/>
+            </a:lnSpc>
+            <a:spcBef>
+              <a:spcPct val="0"/>
+            </a:spcBef>
+            <a:spcAft>
+              <a:spcPct val="35000"/>
+            </a:spcAft>
+            <a:buNone/>
+          </a:pPr>
+          <a:r>
             <a:rPr lang="de-DE" sz="1400" b="1" i="0" u="none" kern="1200" noProof="0" dirty="0" err="1"/>
             <a:t>Improve</a:t>
           </a:r>
@@ -8880,6 +8941,37 @@
             <a:rPr lang="de-DE" sz="1400" b="1" i="0" u="none" kern="1200" noProof="0" dirty="0"/>
             <a:t>Chunk LODs</a:t>
           </a:r>
+        </a:p>
+        <a:p>
+          <a:pPr marL="0" lvl="0" indent="0" algn="l" defTabSz="622300" rtl="0">
+            <a:lnSpc>
+              <a:spcPct val="90000"/>
+            </a:lnSpc>
+            <a:spcBef>
+              <a:spcPct val="0"/>
+            </a:spcBef>
+            <a:spcAft>
+              <a:spcPct val="35000"/>
+            </a:spcAft>
+            <a:buNone/>
+          </a:pPr>
+          <a:r>
+            <a:rPr lang="de-DE" sz="1400" i="1" kern="1200" dirty="0"/>
+            <a:t>smooth normal </a:t>
+          </a:r>
+          <a:r>
+            <a:rPr lang="de-DE" sz="1400" i="1" kern="1200" dirty="0" err="1"/>
+            <a:t>shading</a:t>
+          </a:r>
+          <a:r>
+            <a:rPr lang="de-DE" sz="1400" i="1" kern="1200" dirty="0"/>
+            <a:t> </a:t>
+          </a:r>
+          <a:r>
+            <a:rPr lang="de-DE" sz="1400" i="1" kern="1200" dirty="0" err="1"/>
+            <a:t>test</a:t>
+          </a:r>
+          <a:endParaRPr lang="de-DE" sz="1400" b="1" i="0" u="none" kern="1200" noProof="0" dirty="0"/>
         </a:p>
         <a:p>
           <a:pPr marL="0" lvl="0" indent="0" algn="l" defTabSz="622300" rtl="0">
@@ -9075,14 +9167,63 @@
             <a:rPr lang="de-DE" sz="1400" b="1" i="0" u="none" kern="1200" noProof="0" dirty="0" err="1"/>
             <a:t>Presentation</a:t>
           </a:r>
-          <a:br>
-            <a:rPr lang="de-DE" sz="1400" b="1" i="0" u="none" kern="1200" noProof="0" dirty="0"/>
-          </a:br>
-          <a:r>
-            <a:rPr lang="de-DE" sz="1400" b="0" i="0" u="none" kern="1200" noProof="0" dirty="0" err="1"/>
+          <a:endParaRPr lang="de-DE" sz="1400" b="1" i="0" u="none" kern="1200" noProof="0" dirty="0"/>
+        </a:p>
+        <a:p>
+          <a:pPr marL="0" lvl="0" indent="0" algn="l" defTabSz="622300" rtl="0">
+            <a:lnSpc>
+              <a:spcPct val="90000"/>
+            </a:lnSpc>
+            <a:spcBef>
+              <a:spcPct val="0"/>
+            </a:spcBef>
+            <a:spcAft>
+              <a:spcPct val="35000"/>
+            </a:spcAft>
+            <a:buNone/>
+          </a:pPr>
+          <a:r>
+            <a:rPr lang="de-DE" sz="1400" i="1" kern="1200" dirty="0"/>
+            <a:t>Material </a:t>
+          </a:r>
+          <a:r>
+            <a:rPr lang="de-DE" sz="1400" i="1" kern="1200"/>
+            <a:t>Tweaks</a:t>
+          </a:r>
+        </a:p>
+        <a:p>
+          <a:pPr marL="0" lvl="0" indent="0" algn="l" defTabSz="622300" rtl="0">
+            <a:lnSpc>
+              <a:spcPct val="90000"/>
+            </a:lnSpc>
+            <a:spcBef>
+              <a:spcPct val="0"/>
+            </a:spcBef>
+            <a:spcAft>
+              <a:spcPct val="35000"/>
+            </a:spcAft>
+            <a:buNone/>
+          </a:pPr>
+          <a:r>
+            <a:rPr lang="de-DE" sz="1400" i="1" kern="1200" dirty="0" err="1"/>
             <a:t>Polishing</a:t>
           </a:r>
-          <a:endParaRPr lang="de-DE" sz="1400" kern="1200" noProof="0" dirty="0"/>
+          <a:endParaRPr lang="de-DE" sz="1400" i="1" kern="1200" dirty="0"/>
+        </a:p>
+        <a:p>
+          <a:pPr marL="0" lvl="0" indent="0" algn="l" defTabSz="622300" rtl="0">
+            <a:lnSpc>
+              <a:spcPct val="90000"/>
+            </a:lnSpc>
+            <a:spcBef>
+              <a:spcPct val="0"/>
+            </a:spcBef>
+            <a:spcAft>
+              <a:spcPct val="35000"/>
+            </a:spcAft>
+            <a:buNone/>
+          </a:pPr>
+          <a:endParaRPr lang="de-DE" sz="1400" i="1" kern="1200" dirty="0"/>
         </a:p>
       </dsp:txBody>
       <dsp:txXfrm>
@@ -25575,7 +25716,7 @@
             <p:ph idx="1"/>
             <p:extLst>
               <p:ext uri="{D42A27DB-BD31-4B8C-83A1-F6EECF244321}">
-                <p14:modId xmlns:p14="http://schemas.microsoft.com/office/powerpoint/2010/main" val="3294104799"/>
+                <p14:modId xmlns:p14="http://schemas.microsoft.com/office/powerpoint/2010/main" val="565081228"/>
               </p:ext>
             </p:extLst>
           </p:nvPr>
@@ -25685,7 +25826,7 @@
                   <a:schemeClr val="bg1"/>
                 </a:solidFill>
               </a:rPr>
-              <a:t>With</a:t>
+              <a:t>with</a:t>
             </a:r>
             <a:r>
               <a:rPr lang="de-DE" sz="2000" dirty="0">
@@ -25693,15 +25834,7 @@
                   <a:schemeClr val="bg1"/>
                 </a:solidFill>
               </a:rPr>
-              <a:t> </a:t>
-            </a:r>
-            <a:r>
-              <a:rPr lang="de-DE" sz="2000">
-                <a:solidFill>
-                  <a:schemeClr val="bg1"/>
-                </a:solidFill>
-              </a:rPr>
-              <a:t>Unity &amp; </a:t>
+              <a:t> Unity &amp; </a:t>
             </a:r>
             <a:r>
               <a:rPr lang="de-DE" sz="2000" dirty="0" err="1">
@@ -27703,86 +27836,166 @@
           </a:lstStyle>
           <a:p>
             <a:r>
-              <a:rPr lang="de-DE" sz="2400" b="1" dirty="0" err="1"/>
+              <a:rPr lang="de-DE" sz="2400" b="1" dirty="0" err="1">
+                <a:solidFill>
+                  <a:srgbClr val="FF0000"/>
+                </a:solidFill>
+              </a:rPr>
               <a:t>Improved</a:t>
             </a:r>
             <a:r>
-              <a:rPr lang="de-DE" sz="2400" b="1" dirty="0"/>
+              <a:rPr lang="de-DE" sz="2400" b="1" dirty="0">
+                <a:solidFill>
+                  <a:srgbClr val="FF0000"/>
+                </a:solidFill>
+              </a:rPr>
               <a:t> Density </a:t>
             </a:r>
             <a:r>
-              <a:rPr lang="de-DE" sz="2400" b="1" dirty="0" err="1"/>
+              <a:rPr lang="de-DE" sz="2400" b="1" dirty="0" err="1">
+                <a:solidFill>
+                  <a:srgbClr val="FF0000"/>
+                </a:solidFill>
+              </a:rPr>
               <a:t>Function</a:t>
             </a:r>
             <a:r>
-              <a:rPr lang="de-DE" sz="2400" b="1" dirty="0"/>
+              <a:rPr lang="de-DE" sz="2400" b="1" dirty="0">
+                <a:solidFill>
+                  <a:srgbClr val="FF0000"/>
+                </a:solidFill>
+              </a:rPr>
               <a:t> (</a:t>
             </a:r>
             <a:r>
-              <a:rPr lang="de-DE" sz="2400" b="1" dirty="0" err="1"/>
+              <a:rPr lang="de-DE" sz="2400" b="1" dirty="0" err="1">
+                <a:solidFill>
+                  <a:srgbClr val="FF0000"/>
+                </a:solidFill>
+              </a:rPr>
               <a:t>height</a:t>
             </a:r>
             <a:r>
-              <a:rPr lang="de-DE" sz="2400" b="1" dirty="0"/>
+              <a:rPr lang="de-DE" sz="2400" b="1" dirty="0">
+                <a:solidFill>
+                  <a:srgbClr val="FF0000"/>
+                </a:solidFill>
+              </a:rPr>
               <a:t> </a:t>
             </a:r>
             <a:r>
-              <a:rPr lang="de-DE" sz="2400" b="1" dirty="0" err="1"/>
+              <a:rPr lang="de-DE" sz="2400" b="1" dirty="0" err="1">
+                <a:solidFill>
+                  <a:srgbClr val="FF0000"/>
+                </a:solidFill>
+              </a:rPr>
               <a:t>thresholds</a:t>
             </a:r>
             <a:r>
-              <a:rPr lang="de-DE" sz="2400" b="1" dirty="0"/>
+              <a:rPr lang="de-DE" sz="2400" b="1" dirty="0">
+                <a:solidFill>
+                  <a:srgbClr val="FF0000"/>
+                </a:solidFill>
+              </a:rPr>
               <a:t>, </a:t>
             </a:r>
             <a:r>
-              <a:rPr lang="de-DE" sz="2400" b="1" dirty="0" err="1"/>
+              <a:rPr lang="de-DE" sz="2400" b="1" dirty="0" err="1">
+                <a:solidFill>
+                  <a:srgbClr val="FF0000"/>
+                </a:solidFill>
+              </a:rPr>
               <a:t>noise</a:t>
             </a:r>
             <a:r>
-              <a:rPr lang="de-DE" sz="2400" b="1" dirty="0"/>
+              <a:rPr lang="de-DE" sz="2400" b="1" dirty="0">
+                <a:solidFill>
+                  <a:srgbClr val="FF0000"/>
+                </a:solidFill>
+              </a:rPr>
               <a:t> </a:t>
             </a:r>
             <a:r>
-              <a:rPr lang="de-DE" sz="2400" b="1" dirty="0" err="1"/>
+              <a:rPr lang="de-DE" sz="2400" b="1" dirty="0" err="1">
+                <a:solidFill>
+                  <a:srgbClr val="FF0000"/>
+                </a:solidFill>
+              </a:rPr>
               <a:t>improvements</a:t>
             </a:r>
             <a:r>
-              <a:rPr lang="de-DE" sz="2400" b="1" dirty="0"/>
+              <a:rPr lang="de-DE" sz="2400" b="1" dirty="0">
+                <a:solidFill>
+                  <a:srgbClr val="FF0000"/>
+                </a:solidFill>
+              </a:rPr>
               <a:t>?)</a:t>
             </a:r>
           </a:p>
           <a:p>
             <a:r>
-              <a:rPr lang="de-DE" sz="2400" b="1" dirty="0"/>
+              <a:rPr lang="de-DE" sz="2400" b="1" dirty="0">
+                <a:solidFill>
+                  <a:srgbClr val="FF0000"/>
+                </a:solidFill>
+              </a:rPr>
               <a:t>Chunk Management (LODs, </a:t>
             </a:r>
             <a:r>
-              <a:rPr lang="de-DE" sz="2400" b="1" dirty="0" err="1"/>
+              <a:rPr lang="de-DE" sz="2400" b="1" dirty="0" err="1">
+                <a:solidFill>
+                  <a:srgbClr val="FF0000"/>
+                </a:solidFill>
+              </a:rPr>
               <a:t>draw</a:t>
             </a:r>
             <a:r>
-              <a:rPr lang="de-DE" sz="2400" b="1" dirty="0"/>
+              <a:rPr lang="de-DE" sz="2400" b="1" dirty="0">
+                <a:solidFill>
+                  <a:srgbClr val="FF0000"/>
+                </a:solidFill>
+              </a:rPr>
               <a:t> </a:t>
             </a:r>
             <a:r>
-              <a:rPr lang="de-DE" sz="2400" b="1" dirty="0" err="1"/>
+              <a:rPr lang="de-DE" sz="2400" b="1" dirty="0" err="1">
+                <a:solidFill>
+                  <a:srgbClr val="FF0000"/>
+                </a:solidFill>
+              </a:rPr>
               <a:t>distance</a:t>
             </a:r>
             <a:r>
-              <a:rPr lang="de-DE" sz="2400" b="1" dirty="0"/>
+              <a:rPr lang="de-DE" sz="2400" b="1" dirty="0">
+                <a:solidFill>
+                  <a:srgbClr val="FF0000"/>
+                </a:solidFill>
+              </a:rPr>
               <a:t>)</a:t>
             </a:r>
           </a:p>
           <a:p>
             <a:r>
-              <a:rPr lang="de-DE" sz="2400" b="1" dirty="0"/>
+              <a:rPr lang="de-DE" sz="2400" b="1" dirty="0">
+                <a:solidFill>
+                  <a:srgbClr val="00B050"/>
+                </a:solidFill>
+              </a:rPr>
               <a:t>Efficiency </a:t>
             </a:r>
             <a:r>
-              <a:rPr lang="de-DE" sz="2400" b="1" dirty="0" err="1"/>
+              <a:rPr lang="de-DE" sz="2400" b="1" dirty="0" err="1">
+                <a:solidFill>
+                  <a:srgbClr val="00B050"/>
+                </a:solidFill>
+              </a:rPr>
               <a:t>analysis</a:t>
             </a:r>
-            <a:endParaRPr lang="de-DE" sz="2400" b="1" dirty="0"/>
+            <a:endParaRPr lang="de-DE" sz="2400" b="1" dirty="0">
+              <a:solidFill>
+                <a:srgbClr val="00B050"/>
+              </a:solidFill>
+            </a:endParaRPr>
           </a:p>
           <a:p>
             <a:r>
@@ -27835,8 +28048,14 @@
               <a:t>Planetary Marching Cubes: A Marching Cubes Algorithm for Spherical Space: </a:t>
             </a:r>
             <a:r>
+              <a:rPr lang="de-DE" sz="1800" b="0" i="0" u="none" strike="noStrike" baseline="0" dirty="0">
+                <a:hlinkClick r:id="rId4"/>
+              </a:rPr>
+              <a:t>https://doi.org/10.1145/3301506.3301522</a:t>
+            </a:r>
+            <a:r>
               <a:rPr lang="de-DE" sz="1800" b="0" i="0" u="none" strike="noStrike" baseline="0" dirty="0"/>
-              <a:t>https://doi.org/10.1145/3301506.3301522</a:t>
+              <a:t> </a:t>
             </a:r>
           </a:p>
           <a:p>
@@ -27885,44 +28104,84 @@
           </a:p>
           <a:p>
             <a:r>
-              <a:rPr lang="de-DE" sz="2400" dirty="0"/>
+              <a:rPr lang="de-DE" sz="2400" dirty="0">
+                <a:solidFill>
+                  <a:srgbClr val="00B050"/>
+                </a:solidFill>
+              </a:rPr>
               <a:t>Shader </a:t>
             </a:r>
             <a:r>
-              <a:rPr lang="de-DE" sz="2400" dirty="0" err="1"/>
+              <a:rPr lang="de-DE" sz="2400" dirty="0" err="1">
+                <a:solidFill>
+                  <a:srgbClr val="00B050"/>
+                </a:solidFill>
+              </a:rPr>
               <a:t>based</a:t>
             </a:r>
             <a:r>
-              <a:rPr lang="de-DE" sz="2400" dirty="0"/>
+              <a:rPr lang="de-DE" sz="2400" dirty="0">
+                <a:solidFill>
+                  <a:srgbClr val="00B050"/>
+                </a:solidFill>
+              </a:rPr>
               <a:t> smooth normal </a:t>
             </a:r>
             <a:r>
-              <a:rPr lang="de-DE" sz="2400" dirty="0" err="1"/>
+              <a:rPr lang="de-DE" sz="2400" dirty="0" err="1">
+                <a:solidFill>
+                  <a:srgbClr val="00B050"/>
+                </a:solidFill>
+              </a:rPr>
               <a:t>shading</a:t>
             </a:r>
             <a:r>
-              <a:rPr lang="de-DE" sz="2400" dirty="0"/>
+              <a:rPr lang="de-DE" sz="2400" dirty="0">
+                <a:solidFill>
+                  <a:srgbClr val="00B050"/>
+                </a:solidFill>
+              </a:rPr>
               <a:t> (via </a:t>
             </a:r>
             <a:r>
-              <a:rPr lang="de-DE" sz="2400" dirty="0" err="1"/>
+              <a:rPr lang="de-DE" sz="2400" dirty="0" err="1">
+                <a:solidFill>
+                  <a:srgbClr val="00B050"/>
+                </a:solidFill>
+              </a:rPr>
               <a:t>compute</a:t>
             </a:r>
             <a:r>
-              <a:rPr lang="de-DE" sz="2400" dirty="0"/>
+              <a:rPr lang="de-DE" sz="2400" dirty="0">
+                <a:solidFill>
+                  <a:srgbClr val="00B050"/>
+                </a:solidFill>
+              </a:rPr>
               <a:t> </a:t>
             </a:r>
             <a:r>
-              <a:rPr lang="de-DE" sz="2400" dirty="0" err="1"/>
+              <a:rPr lang="de-DE" sz="2400" dirty="0" err="1">
+                <a:solidFill>
+                  <a:srgbClr val="00B050"/>
+                </a:solidFill>
+              </a:rPr>
               <a:t>shaders</a:t>
             </a:r>
             <a:r>
-              <a:rPr lang="de-DE" sz="2400" dirty="0"/>
+              <a:rPr lang="de-DE" sz="2400" dirty="0">
+                <a:solidFill>
+                  <a:srgbClr val="00B050"/>
+                </a:solidFill>
+              </a:rPr>
               <a:t>)</a:t>
             </a:r>
           </a:p>
           <a:p>
-            <a:endParaRPr lang="de-DE" sz="2400" dirty="0"/>
+            <a:endParaRPr lang="de-DE" sz="2400" dirty="0">
+              <a:solidFill>
+                <a:srgbClr val="00B050"/>
+              </a:solidFill>
+            </a:endParaRPr>
           </a:p>
           <a:p>
             <a:endParaRPr lang="de-DE" dirty="0"/>
@@ -28734,21 +28993,21 @@
 </file>
 
 <file path=customXml/item1.xml><?xml version="1.0" encoding="utf-8"?>
+<p:properties xmlns:p="http://schemas.microsoft.com/office/2006/metadata/properties" xmlns:xsi="http://www.w3.org/2001/XMLSchema-instance" xmlns:pc="http://schemas.microsoft.com/office/infopath/2007/PartnerControls">
+  <documentManagement>
+    <Status xmlns="71af3243-3dd4-4a8d-8c0d-dd76da1f02a5">Not started</Status>
+    <MediaServiceKeyPoints xmlns="71af3243-3dd4-4a8d-8c0d-dd76da1f02a5" xsi:nil="true"/>
+  </documentManagement>
+</p:properties>
+</file>
+
+<file path=customXml/item2.xml><?xml version="1.0" encoding="utf-8"?>
 <?mso-contentType ?>
 <FormTemplates xmlns="http://schemas.microsoft.com/sharepoint/v3/contenttype/forms">
   <Display>DocumentLibraryForm</Display>
   <Edit>DocumentLibraryForm</Edit>
   <New>DocumentLibraryForm</New>
 </FormTemplates>
-</file>
-
-<file path=customXml/item2.xml><?xml version="1.0" encoding="utf-8"?>
-<p:properties xmlns:p="http://schemas.microsoft.com/office/2006/metadata/properties" xmlns:xsi="http://www.w3.org/2001/XMLSchema-instance" xmlns:pc="http://schemas.microsoft.com/office/infopath/2007/PartnerControls">
-  <documentManagement>
-    <Status xmlns="71af3243-3dd4-4a8d-8c0d-dd76da1f02a5">Not started</Status>
-    <MediaServiceKeyPoints xmlns="71af3243-3dd4-4a8d-8c0d-dd76da1f02a5" xsi:nil="true"/>
-  </documentManagement>
-</p:properties>
 </file>
 
 <file path=customXml/item3.xml><?xml version="1.0" encoding="utf-8"?>
@@ -28973,19 +29232,19 @@
 </file>
 
 <file path=customXml/itemProps1.xml><?xml version="1.0" encoding="utf-8"?>
-<ds:datastoreItem xmlns:ds="http://schemas.openxmlformats.org/officeDocument/2006/customXml" ds:itemID="{3C8E00D1-8EA3-4E42-801D-0253E1EAFC21}">
+<ds:datastoreItem xmlns:ds="http://schemas.openxmlformats.org/officeDocument/2006/customXml" ds:itemID="{99919F73-B6C2-4A43-95E2-833EC48925FE}">
   <ds:schemaRefs>
-    <ds:schemaRef ds:uri="http://schemas.microsoft.com/sharepoint/v3/contenttype/forms"/>
+    <ds:schemaRef ds:uri="http://schemas.microsoft.com/office/2006/metadata/properties"/>
+    <ds:schemaRef ds:uri="http://schemas.microsoft.com/office/infopath/2007/PartnerControls"/>
+    <ds:schemaRef ds:uri="71af3243-3dd4-4a8d-8c0d-dd76da1f02a5"/>
   </ds:schemaRefs>
 </ds:datastoreItem>
 </file>
 
 <file path=customXml/itemProps2.xml><?xml version="1.0" encoding="utf-8"?>
-<ds:datastoreItem xmlns:ds="http://schemas.openxmlformats.org/officeDocument/2006/customXml" ds:itemID="{99919F73-B6C2-4A43-95E2-833EC48925FE}">
+<ds:datastoreItem xmlns:ds="http://schemas.openxmlformats.org/officeDocument/2006/customXml" ds:itemID="{3C8E00D1-8EA3-4E42-801D-0253E1EAFC21}">
   <ds:schemaRefs>
-    <ds:schemaRef ds:uri="http://schemas.microsoft.com/office/2006/metadata/properties"/>
-    <ds:schemaRef ds:uri="http://schemas.microsoft.com/office/infopath/2007/PartnerControls"/>
-    <ds:schemaRef ds:uri="71af3243-3dd4-4a8d-8c0d-dd76da1f02a5"/>
+    <ds:schemaRef ds:uri="http://schemas.microsoft.com/sharepoint/v3/contenttype/forms"/>
   </ds:schemaRefs>
 </ds:datastoreItem>
 </file>

</xml_diff>

<commit_message>
Material & LOD Tweaks
</commit_message>
<xml_diff>
--- a/Computergrafik Praktikum.pptx
+++ b/Computergrafik Praktikum.pptx
@@ -18382,7 +18382,7 @@
           <a:p>
             <a:fld id="{67702A17-7AE3-4B44-889C-4D77A0FC7177}" type="datetime1">
               <a:rPr lang="de-DE" smtClean="0"/>
-              <a:t>16.01.2023</a:t>
+              <a:t>17.01.2023</a:t>
             </a:fld>
             <a:endParaRPr lang="de-DE" dirty="0"/>
           </a:p>
@@ -18562,7 +18562,7 @@
             <a:fld id="{82650ACC-C7DD-445E-BC27-71FC31906D7B}" type="datetime1">
               <a:rPr lang="de-DE" smtClean="0"/>
               <a:pPr/>
-              <a:t>16.01.2023</a:t>
+              <a:t>17.01.2023</a:t>
             </a:fld>
             <a:endParaRPr lang="de-DE" dirty="0"/>
           </a:p>
@@ -30869,7 +30869,15 @@
             </a:r>
             <a:r>
               <a:rPr lang="de-DE" sz="2000" dirty="0"/>
-              <a:t> ok, but terrible </a:t>
+              <a:t> ok, but </a:t>
+            </a:r>
+            <a:r>
+              <a:rPr lang="de-DE" sz="2000" dirty="0" err="1"/>
+              <a:t>bad</a:t>
+            </a:r>
+            <a:r>
+              <a:rPr lang="de-DE" sz="2000" dirty="0"/>
+              <a:t> </a:t>
             </a:r>
             <a:r>
               <a:rPr lang="de-DE" sz="2000" dirty="0" err="1"/>
@@ -34717,21 +34725,21 @@
 </file>
 
 <file path=customXml/item1.xml><?xml version="1.0" encoding="utf-8"?>
+<p:properties xmlns:p="http://schemas.microsoft.com/office/2006/metadata/properties" xmlns:xsi="http://www.w3.org/2001/XMLSchema-instance" xmlns:pc="http://schemas.microsoft.com/office/infopath/2007/PartnerControls">
+  <documentManagement>
+    <Status xmlns="71af3243-3dd4-4a8d-8c0d-dd76da1f02a5">Not started</Status>
+    <MediaServiceKeyPoints xmlns="71af3243-3dd4-4a8d-8c0d-dd76da1f02a5" xsi:nil="true"/>
+  </documentManagement>
+</p:properties>
+</file>
+
+<file path=customXml/item2.xml><?xml version="1.0" encoding="utf-8"?>
 <?mso-contentType ?>
 <FormTemplates xmlns="http://schemas.microsoft.com/sharepoint/v3/contenttype/forms">
   <Display>DocumentLibraryForm</Display>
   <Edit>DocumentLibraryForm</Edit>
   <New>DocumentLibraryForm</New>
 </FormTemplates>
-</file>
-
-<file path=customXml/item2.xml><?xml version="1.0" encoding="utf-8"?>
-<p:properties xmlns:p="http://schemas.microsoft.com/office/2006/metadata/properties" xmlns:xsi="http://www.w3.org/2001/XMLSchema-instance" xmlns:pc="http://schemas.microsoft.com/office/infopath/2007/PartnerControls">
-  <documentManagement>
-    <Status xmlns="71af3243-3dd4-4a8d-8c0d-dd76da1f02a5">Not started</Status>
-    <MediaServiceKeyPoints xmlns="71af3243-3dd4-4a8d-8c0d-dd76da1f02a5" xsi:nil="true"/>
-  </documentManagement>
-</p:properties>
 </file>
 
 <file path=customXml/item3.xml><?xml version="1.0" encoding="utf-8"?>
@@ -34956,19 +34964,19 @@
 </file>
 
 <file path=customXml/itemProps1.xml><?xml version="1.0" encoding="utf-8"?>
-<ds:datastoreItem xmlns:ds="http://schemas.openxmlformats.org/officeDocument/2006/customXml" ds:itemID="{3C8E00D1-8EA3-4E42-801D-0253E1EAFC21}">
+<ds:datastoreItem xmlns:ds="http://schemas.openxmlformats.org/officeDocument/2006/customXml" ds:itemID="{99919F73-B6C2-4A43-95E2-833EC48925FE}">
   <ds:schemaRefs>
-    <ds:schemaRef ds:uri="http://schemas.microsoft.com/sharepoint/v3/contenttype/forms"/>
+    <ds:schemaRef ds:uri="http://schemas.microsoft.com/office/2006/metadata/properties"/>
+    <ds:schemaRef ds:uri="http://schemas.microsoft.com/office/infopath/2007/PartnerControls"/>
+    <ds:schemaRef ds:uri="71af3243-3dd4-4a8d-8c0d-dd76da1f02a5"/>
   </ds:schemaRefs>
 </ds:datastoreItem>
 </file>
 
 <file path=customXml/itemProps2.xml><?xml version="1.0" encoding="utf-8"?>
-<ds:datastoreItem xmlns:ds="http://schemas.openxmlformats.org/officeDocument/2006/customXml" ds:itemID="{99919F73-B6C2-4A43-95E2-833EC48925FE}">
+<ds:datastoreItem xmlns:ds="http://schemas.openxmlformats.org/officeDocument/2006/customXml" ds:itemID="{3C8E00D1-8EA3-4E42-801D-0253E1EAFC21}">
   <ds:schemaRefs>
-    <ds:schemaRef ds:uri="http://schemas.microsoft.com/office/2006/metadata/properties"/>
-    <ds:schemaRef ds:uri="http://schemas.microsoft.com/office/infopath/2007/PartnerControls"/>
-    <ds:schemaRef ds:uri="71af3243-3dd4-4a8d-8c0d-dd76da1f02a5"/>
+    <ds:schemaRef ds:uri="http://schemas.microsoft.com/sharepoint/v3/contenttype/forms"/>
   </ds:schemaRefs>
 </ds:datastoreItem>
 </file>

</xml_diff>